<commit_message>
Alterando aula para apresentação pptx;
</commit_message>
<xml_diff>
--- a/Aulas/Aula-02-Proj-Vis-Dados.pptx
+++ b/Aulas/Aula-02-Proj-Vis-Dados.pptx
@@ -5,7 +5,7 @@
     <p:sldMasterId id="2147483648" r:id="rId1"/>
   </p:sldMasterIdLst>
   <p:notesMasterIdLst>
-    <p:notesMasterId r:id="rId25"/>
+    <p:notesMasterId r:id="rId28"/>
   </p:notesMasterIdLst>
   <p:sldIdLst>
     <p:sldId id="256" r:id="rId2"/>
@@ -31,6 +31,9 @@
     <p:sldId id="276" r:id="rId22"/>
     <p:sldId id="277" r:id="rId23"/>
     <p:sldId id="278" r:id="rId24"/>
+    <p:sldId id="279" r:id="rId25"/>
+    <p:sldId id="280" r:id="rId26"/>
+    <p:sldId id="281" r:id="rId27"/>
   </p:sldIdLst>
   <p:sldSz cx="9144000" cy="5143500" type="screen16x9"/>
   <p:notesSz cx="9144000" cy="6858000"/>
@@ -643,6 +646,308 @@
             <a:fld id="{C449B3EA-B995-2945-B5D0-699FC22F24A8}" type="slidenum">
               <a:rPr lang="en-US"/>
               <a:t>6</a:t>
+            </a:fld>
+            <a:endParaRPr lang="en-US"/>
+          </a:p>
+        </p:txBody>
+      </p:sp>
+    </p:spTree>
+  </p:cSld>
+</p:notes>
+</file>
+
+<file path=ppt/notesSlides/notesSlide10.xml><?xml version="1.0" encoding="utf-8"?>
+<p:notes xmlns:a="http://schemas.openxmlformats.org/drawingml/2006/main" xmlns:r="http://schemas.openxmlformats.org/officeDocument/2006/relationships" xmlns:p="http://schemas.openxmlformats.org/presentationml/2006/main">
+  <p:cSld>
+    <p:spTree>
+      <p:nvGrpSpPr>
+        <p:cNvPr id="1" name=""/>
+        <p:cNvGrpSpPr/>
+        <p:nvPr/>
+      </p:nvGrpSpPr>
+      <p:grpSpPr>
+        <a:xfrm>
+          <a:off x="0" y="0"/>
+          <a:ext cx="0" cy="0"/>
+          <a:chOff x="0" y="0"/>
+          <a:chExt cx="0" cy="0"/>
+        </a:xfrm>
+      </p:grpSpPr>
+      <p:sp>
+        <p:nvSpPr>
+          <p:cNvPr id="2" name="Slide Image Placeholder 1"/>
+          <p:cNvSpPr>
+            <a:spLocks noGrp="1" noRot="1" noChangeAspect="1"/>
+          </p:cNvSpPr>
+          <p:nvPr>
+            <p:ph type="sldImg"/>
+          </p:nvPr>
+        </p:nvSpPr>
+        <p:spPr/>
+      </p:sp>
+      <p:sp>
+        <p:nvSpPr>
+          <p:cNvPr id="3" name="Notes Placeholder 2"/>
+          <p:cNvSpPr>
+            <a:spLocks noGrp="1"/>
+          </p:cNvSpPr>
+          <p:nvPr>
+            <p:ph type="body" idx="1"/>
+          </p:nvPr>
+        </p:nvSpPr>
+        <p:spPr/>
+        <p:txBody>
+          <a:bodyPr/>
+          <a:lstStyle/>
+          <a:p>
+            <a:pPr lvl="0" indent="0" marL="0">
+              <a:buNone/>
+            </a:pPr>
+            <a:r>
+              <a:rPr/>
+              <a:t>Atributos pré-atencionais (imagem) Elementos em texto -&gt; negrito, cor, itálico, tamanho, espaço, encapsulamento e sublinhado.</a:t>
+            </a:r>
+          </a:p>
+        </p:txBody>
+      </p:sp>
+      <p:sp>
+        <p:nvSpPr>
+          <p:cNvPr id="4" name="Slide Number Placeholder 3"/>
+          <p:cNvSpPr>
+            <a:spLocks noGrp="1"/>
+          </p:cNvSpPr>
+          <p:nvPr>
+            <p:ph type="sldNum" sz="quarter" idx="10"/>
+          </p:nvPr>
+        </p:nvSpPr>
+        <p:spPr/>
+        <p:txBody>
+          <a:bodyPr/>
+          <a:lstStyle/>
+          <a:p>
+            <a:fld id="{C449B3EA-B995-2945-B5D0-699FC22F24A8}" type="slidenum">
+              <a:rPr lang="en-US"/>
+              <a:t>21</a:t>
+            </a:fld>
+            <a:endParaRPr lang="en-US"/>
+          </a:p>
+        </p:txBody>
+      </p:sp>
+    </p:spTree>
+  </p:cSld>
+</p:notes>
+</file>
+
+<file path=ppt/notesSlides/notesSlide11.xml><?xml version="1.0" encoding="utf-8"?>
+<p:notes xmlns:a="http://schemas.openxmlformats.org/drawingml/2006/main" xmlns:r="http://schemas.openxmlformats.org/officeDocument/2006/relationships" xmlns:p="http://schemas.openxmlformats.org/presentationml/2006/main">
+  <p:cSld>
+    <p:spTree>
+      <p:nvGrpSpPr>
+        <p:cNvPr id="1" name=""/>
+        <p:cNvGrpSpPr/>
+        <p:nvPr/>
+      </p:nvGrpSpPr>
+      <p:grpSpPr>
+        <a:xfrm>
+          <a:off x="0" y="0"/>
+          <a:ext cx="0" cy="0"/>
+          <a:chOff x="0" y="0"/>
+          <a:chExt cx="0" cy="0"/>
+        </a:xfrm>
+      </p:grpSpPr>
+      <p:sp>
+        <p:nvSpPr>
+          <p:cNvPr id="2" name="Slide Image Placeholder 1"/>
+          <p:cNvSpPr>
+            <a:spLocks noGrp="1" noRot="1" noChangeAspect="1"/>
+          </p:cNvSpPr>
+          <p:nvPr>
+            <p:ph type="sldImg"/>
+          </p:nvPr>
+        </p:nvSpPr>
+        <p:spPr/>
+      </p:sp>
+      <p:sp>
+        <p:nvSpPr>
+          <p:cNvPr id="3" name="Notes Placeholder 2"/>
+          <p:cNvSpPr>
+            <a:spLocks noGrp="1"/>
+          </p:cNvSpPr>
+          <p:nvPr>
+            <p:ph type="body" idx="1"/>
+          </p:nvPr>
+        </p:nvSpPr>
+        <p:spPr/>
+        <p:txBody>
+          <a:bodyPr/>
+          <a:lstStyle/>
+          <a:p>
+            <a:pPr lvl="0" indent="0" marL="0">
+              <a:buNone/>
+            </a:pPr>
+            <a:r>
+              <a:rPr/>
+              <a:t>Forma e propósito -&gt; Eliminar distração, evidênciar o que é importante. Também é interessante criar uma hierarquia da informação.</a:t>
+            </a:r>
+          </a:p>
+          <a:p>
+            <a:pPr lvl="0" indent="0" marL="0">
+              <a:buNone/>
+            </a:pPr>
+          </a:p>
+          <a:p>
+            <a:pPr lvl="0" indent="0" marL="0">
+              <a:buNone/>
+            </a:pPr>
+            <a:r>
+              <a:rPr/>
+              <a:t>Acessibilidade -&gt; Facilitar compreensão, usar textos, pensar em diferentes tipos de público</a:t>
+            </a:r>
+          </a:p>
+          <a:p>
+            <a:pPr lvl="0" indent="0" marL="0">
+              <a:buNone/>
+            </a:pPr>
+          </a:p>
+          <a:p>
+            <a:pPr lvl="0" indent="0" marL="0">
+              <a:buNone/>
+            </a:pPr>
+            <a:r>
+              <a:rPr/>
+              <a:t>Estética -&gt; Uso de cores com sabedoria, alinhamentos, aproveitar espaço em branco.</a:t>
+            </a:r>
+          </a:p>
+        </p:txBody>
+      </p:sp>
+      <p:sp>
+        <p:nvSpPr>
+          <p:cNvPr id="4" name="Slide Number Placeholder 3"/>
+          <p:cNvSpPr>
+            <a:spLocks noGrp="1"/>
+          </p:cNvSpPr>
+          <p:nvPr>
+            <p:ph type="sldNum" sz="quarter" idx="10"/>
+          </p:nvPr>
+        </p:nvSpPr>
+        <p:spPr/>
+        <p:txBody>
+          <a:bodyPr/>
+          <a:lstStyle/>
+          <a:p>
+            <a:fld id="{C449B3EA-B995-2945-B5D0-699FC22F24A8}" type="slidenum">
+              <a:rPr lang="en-US"/>
+              <a:t>23</a:t>
+            </a:fld>
+            <a:endParaRPr lang="en-US"/>
+          </a:p>
+        </p:txBody>
+      </p:sp>
+    </p:spTree>
+  </p:cSld>
+</p:notes>
+</file>
+
+<file path=ppt/notesSlides/notesSlide12.xml><?xml version="1.0" encoding="utf-8"?>
+<p:notes xmlns:a="http://schemas.openxmlformats.org/drawingml/2006/main" xmlns:r="http://schemas.openxmlformats.org/officeDocument/2006/relationships" xmlns:p="http://schemas.openxmlformats.org/presentationml/2006/main">
+  <p:cSld>
+    <p:spTree>
+      <p:nvGrpSpPr>
+        <p:cNvPr id="1" name=""/>
+        <p:cNvGrpSpPr/>
+        <p:nvPr/>
+      </p:nvGrpSpPr>
+      <p:grpSpPr>
+        <a:xfrm>
+          <a:off x="0" y="0"/>
+          <a:ext cx="0" cy="0"/>
+          <a:chOff x="0" y="0"/>
+          <a:chExt cx="0" cy="0"/>
+        </a:xfrm>
+      </p:grpSpPr>
+      <p:sp>
+        <p:nvSpPr>
+          <p:cNvPr id="2" name="Slide Image Placeholder 1"/>
+          <p:cNvSpPr>
+            <a:spLocks noGrp="1" noRot="1" noChangeAspect="1"/>
+          </p:cNvSpPr>
+          <p:nvPr>
+            <p:ph type="sldImg"/>
+          </p:nvPr>
+        </p:nvSpPr>
+        <p:spPr/>
+      </p:sp>
+      <p:sp>
+        <p:nvSpPr>
+          <p:cNvPr id="3" name="Notes Placeholder 2"/>
+          <p:cNvSpPr>
+            <a:spLocks noGrp="1"/>
+          </p:cNvSpPr>
+          <p:nvPr>
+            <p:ph type="body" idx="1"/>
+          </p:nvPr>
+        </p:nvSpPr>
+        <p:spPr/>
+        <p:txBody>
+          <a:bodyPr/>
+          <a:lstStyle/>
+          <a:p>
+            <a:pPr lvl="0" indent="0" marL="0">
+              <a:buNone/>
+            </a:pPr>
+            <a:r>
+              <a:rPr/>
+              <a:t>Início, meio e fim</a:t>
+            </a:r>
+          </a:p>
+          <a:p>
+            <a:pPr lvl="0" indent="0" marL="0">
+              <a:buNone/>
+            </a:pPr>
+          </a:p>
+          <a:p>
+            <a:pPr lvl="0" indent="0" marL="0">
+              <a:buNone/>
+            </a:pPr>
+            <a:r>
+              <a:rPr/>
+              <a:t>Utilizar repetição</a:t>
+            </a:r>
+          </a:p>
+          <a:p>
+            <a:pPr lvl="0" indent="0" marL="0">
+              <a:buNone/>
+            </a:pPr>
+          </a:p>
+          <a:p>
+            <a:pPr lvl="0" indent="0" marL="0">
+              <a:buNone/>
+            </a:pPr>
+            <a:r>
+              <a:rPr/>
+              <a:t>Táticas para contar história (lógica horizontal, vertical, storyboard reverso)</a:t>
+            </a:r>
+          </a:p>
+        </p:txBody>
+      </p:sp>
+      <p:sp>
+        <p:nvSpPr>
+          <p:cNvPr id="4" name="Slide Number Placeholder 3"/>
+          <p:cNvSpPr>
+            <a:spLocks noGrp="1"/>
+          </p:cNvSpPr>
+          <p:nvPr>
+            <p:ph type="sldNum" sz="quarter" idx="10"/>
+          </p:nvPr>
+        </p:nvSpPr>
+        <p:spPr/>
+        <p:txBody>
+          <a:bodyPr/>
+          <a:lstStyle/>
+          <a:p>
+            <a:fld id="{C449B3EA-B995-2945-B5D0-699FC22F24A8}" type="slidenum">
+              <a:rPr lang="en-US"/>
+              <a:t>24</a:t>
             </a:fld>
             <a:endParaRPr lang="en-US"/>
           </a:p>
@@ -9320,8 +9625,199 @@
           <a:chExt cx="0" cy="0"/>
         </a:xfrm>
       </p:grpSpPr>
+      <p:sp>
+        <p:nvSpPr>
+          <p:cNvPr id="2" name="Title 1"/>
+          <p:cNvSpPr>
+            <a:spLocks noGrp="1"/>
+          </p:cNvSpPr>
+          <p:nvPr>
+            <p:ph hasCustomPrompt="1" type="title"/>
+          </p:nvPr>
+        </p:nvSpPr>
+        <p:spPr>
+          <a:xfrm>
+            <a:off x="353292" y="238755"/>
+            <a:ext cx="8617526" cy="498666"/>
+          </a:xfrm>
+        </p:spPr>
+        <p:txBody>
+          <a:bodyPr/>
+          <a:lstStyle/>
+          <a:p>
+            <a:pPr lvl="0" indent="0" marL="0">
+              <a:buNone/>
+            </a:pPr>
+            <a:r>
+              <a:rPr/>
+              <a:t>Atenção e foco</a:t>
+            </a:r>
+          </a:p>
+        </p:txBody>
+      </p:sp>
+      <p:sp>
+        <p:nvSpPr>
+          <p:cNvPr id="3" name="Content Placeholder 2"/>
+          <p:cNvSpPr>
+            <a:spLocks noGrp="1"/>
+          </p:cNvSpPr>
+          <p:nvPr>
+            <p:ph idx="1"/>
+          </p:nvPr>
+        </p:nvSpPr>
+        <p:spPr/>
+        <p:txBody>
+          <a:bodyPr/>
+          <a:lstStyle/>
+          <a:p>
+            <a:pPr lvl="0"/>
+            <a:r>
+              <a:rPr/>
+              <a:t>Uso de atributos pré-atencionais</a:t>
+            </a:r>
+          </a:p>
+          <a:p>
+            <a:pPr lvl="0"/>
+            <a:r>
+              <a:rPr/>
+              <a:t>Uso de elementos em texto</a:t>
+            </a:r>
+          </a:p>
+        </p:txBody>
+      </p:sp>
     </p:spTree>
   </p:cSld>
+  <p:timing>
+    <p:tnLst>
+      <p:par>
+        <p:cTn id="1" dur="indefinite" restart="never" nodeType="tmRoot">
+          <p:childTnLst>
+            <p:seq concurrent="1" nextAc="seek">
+              <p:cTn id="2" dur="indefinite" nodeType="mainSeq">
+                <p:childTnLst>
+                  <p:par>
+                    <p:cTn id="3" fill="hold">
+                      <p:stCondLst>
+                        <p:cond delay="indefinite"/>
+                      </p:stCondLst>
+                      <p:childTnLst>
+                        <p:par>
+                          <p:cTn id="4" fill="hold">
+                            <p:stCondLst>
+                              <p:cond delay="0"/>
+                            </p:stCondLst>
+                            <p:childTnLst>
+                              <p:par>
+                                <p:cTn id="5" presetID="1" presetClass="entr" presetSubtype="0" fill="hold" grpId="0" nodeType="clickEffect">
+                                  <p:stCondLst>
+                                    <p:cond delay="0"/>
+                                  </p:stCondLst>
+                                  <p:childTnLst>
+                                    <p:set>
+                                      <p:cBhvr>
+                                        <p:cTn id="6" dur="1" fill="hold">
+                                          <p:stCondLst>
+                                            <p:cond delay="0"/>
+                                          </p:stCondLst>
+                                        </p:cTn>
+                                        <p:tgtEl>
+                                          <p:spTgt spid="3">
+                                            <p:txEl>
+                                              <p:pRg st="0" end="0"/>
+                                            </p:txEl>
+                                          </p:spTgt>
+                                        </p:tgtEl>
+                                        <p:attrNameLst>
+                                          <p:attrName>style.visibility</p:attrName>
+                                        </p:attrNameLst>
+                                      </p:cBhvr>
+                                      <p:to>
+                                        <p:strVal val="visible"/>
+                                      </p:to>
+                                    </p:set>
+                                  </p:childTnLst>
+                                </p:cTn>
+                              </p:par>
+                            </p:childTnLst>
+                          </p:cTn>
+                        </p:par>
+                      </p:childTnLst>
+                    </p:cTn>
+                  </p:par>
+                  <p:par>
+                    <p:cTn id="7" fill="hold">
+                      <p:stCondLst>
+                        <p:cond delay="indefinite"/>
+                      </p:stCondLst>
+                      <p:childTnLst>
+                        <p:par>
+                          <p:cTn id="8" fill="hold">
+                            <p:stCondLst>
+                              <p:cond delay="0"/>
+                            </p:stCondLst>
+                            <p:childTnLst>
+                              <p:par>
+                                <p:cTn id="9" presetID="1" presetClass="entr" presetSubtype="0" fill="hold" grpId="0" nodeType="clickEffect">
+                                  <p:stCondLst>
+                                    <p:cond delay="0"/>
+                                  </p:stCondLst>
+                                  <p:childTnLst>
+                                    <p:set>
+                                      <p:cBhvr>
+                                        <p:cTn id="10" dur="1" fill="hold">
+                                          <p:stCondLst>
+                                            <p:cond delay="0"/>
+                                          </p:stCondLst>
+                                        </p:cTn>
+                                        <p:tgtEl>
+                                          <p:spTgt spid="3">
+                                            <p:txEl>
+                                              <p:pRg st="1" end="1"/>
+                                            </p:txEl>
+                                          </p:spTgt>
+                                        </p:tgtEl>
+                                        <p:attrNameLst>
+                                          <p:attrName>style.visibility</p:attrName>
+                                        </p:attrNameLst>
+                                      </p:cBhvr>
+                                      <p:to>
+                                        <p:strVal val="visible"/>
+                                      </p:to>
+                                    </p:set>
+                                  </p:childTnLst>
+                                </p:cTn>
+                              </p:par>
+                            </p:childTnLst>
+                          </p:cTn>
+                        </p:par>
+                      </p:childTnLst>
+                    </p:cTn>
+                  </p:par>
+                </p:childTnLst>
+              </p:cTn>
+              <p:prevCondLst>
+                <p:cond evt="onPrev" delay="0">
+                  <p:tgtEl>
+                    <p:sldTgt/>
+                  </p:tgtEl>
+                </p:cond>
+              </p:prevCondLst>
+              <p:nextCondLst>
+                <p:cond evt="onNext" delay="0">
+                  <p:tgtEl>
+                    <p:sldTgt/>
+                  </p:tgtEl>
+                </p:cond>
+              </p:nextCondLst>
+            </p:seq>
+          </p:childTnLst>
+        </p:cTn>
+      </p:par>
+    </p:tnLst>
+    <p:bldLst>
+      <p:bldP spid="3" grpId="0" uiExpand="1" build="p"/>
+    </p:bldLst>
+  </p:timing>
 </p:sld>
 </file>
 
@@ -9342,6 +9838,66 @@
           <a:chExt cx="0" cy="0"/>
         </a:xfrm>
       </p:grpSpPr>
+      <p:sp>
+        <p:nvSpPr>
+          <p:cNvPr id="2" name="Title 1"/>
+          <p:cNvSpPr>
+            <a:spLocks noGrp="1"/>
+          </p:cNvSpPr>
+          <p:nvPr>
+            <p:ph hasCustomPrompt="1" type="title"/>
+          </p:nvPr>
+        </p:nvSpPr>
+        <p:spPr>
+          <a:xfrm>
+            <a:off x="353292" y="238755"/>
+            <a:ext cx="8617526" cy="498666"/>
+          </a:xfrm>
+        </p:spPr>
+        <p:txBody>
+          <a:bodyPr/>
+          <a:lstStyle/>
+          <a:p>
+            <a:pPr lvl="0" indent="0" marL="0">
+              <a:buNone/>
+            </a:pPr>
+            <a:r>
+              <a:rPr/>
+              <a:t>Atributos pré-atencionais</a:t>
+            </a:r>
+          </a:p>
+        </p:txBody>
+      </p:sp>
+      <p:pic>
+        <p:nvPicPr>
+          <p:cNvPr descr="../imagens/preemptive-atributes.png" id="0" name="Picture 1"/>
+          <p:cNvPicPr>
+            <a:picLocks noGrp="1" noChangeAspect="1"/>
+          </p:cNvPicPr>
+          <p:nvPr/>
+        </p:nvPicPr>
+        <p:blipFill>
+          <a:blip r:embed="rId2"/>
+          <a:stretch>
+            <a:fillRect/>
+          </a:stretch>
+        </p:blipFill>
+        <p:spPr bwMode="auto">
+          <a:xfrm>
+            <a:off x="1714500" y="965200"/>
+            <a:ext cx="5854700" cy="3505200"/>
+          </a:xfrm>
+          <a:prstGeom prst="rect">
+            <a:avLst/>
+          </a:prstGeom>
+          <a:noFill/>
+          <a:ln w="9525">
+            <a:noFill/>
+            <a:headEnd/>
+            <a:tailEnd/>
+          </a:ln>
+        </p:spPr>
+      </p:pic>
     </p:spTree>
   </p:cSld>
 </p:sld>
@@ -9364,6 +9920,787 @@
           <a:chExt cx="0" cy="0"/>
         </a:xfrm>
       </p:grpSpPr>
+      <p:sp>
+        <p:nvSpPr>
+          <p:cNvPr id="2" name="Title 1"/>
+          <p:cNvSpPr>
+            <a:spLocks noGrp="1"/>
+          </p:cNvSpPr>
+          <p:nvPr>
+            <p:ph hasCustomPrompt="1" type="title"/>
+          </p:nvPr>
+        </p:nvSpPr>
+        <p:spPr>
+          <a:xfrm>
+            <a:off x="353292" y="238755"/>
+            <a:ext cx="8617526" cy="498666"/>
+          </a:xfrm>
+        </p:spPr>
+        <p:txBody>
+          <a:bodyPr/>
+          <a:lstStyle/>
+          <a:p>
+            <a:pPr lvl="0" indent="0" marL="0">
+              <a:buNone/>
+            </a:pPr>
+            <a:r>
+              <a:rPr/>
+              <a:t>Pense como um designer</a:t>
+            </a:r>
+          </a:p>
+        </p:txBody>
+      </p:sp>
+      <p:sp>
+        <p:nvSpPr>
+          <p:cNvPr id="3" name="Content Placeholder 2"/>
+          <p:cNvSpPr>
+            <a:spLocks noGrp="1"/>
+          </p:cNvSpPr>
+          <p:nvPr>
+            <p:ph idx="1"/>
+          </p:nvPr>
+        </p:nvSpPr>
+        <p:spPr/>
+        <p:txBody>
+          <a:bodyPr/>
+          <a:lstStyle/>
+          <a:p>
+            <a:pPr lvl="0"/>
+            <a:r>
+              <a:rPr/>
+              <a:t>Forma e propósito</a:t>
+            </a:r>
+          </a:p>
+          <a:p>
+            <a:pPr lvl="0"/>
+            <a:r>
+              <a:rPr/>
+              <a:t>Acessibilidade</a:t>
+            </a:r>
+          </a:p>
+          <a:p>
+            <a:pPr lvl="0"/>
+            <a:r>
+              <a:rPr/>
+              <a:t>Estética</a:t>
+            </a:r>
+          </a:p>
+        </p:txBody>
+      </p:sp>
+    </p:spTree>
+  </p:cSld>
+  <p:timing>
+    <p:tnLst>
+      <p:par>
+        <p:cTn id="1" dur="indefinite" restart="never" nodeType="tmRoot">
+          <p:childTnLst>
+            <p:seq concurrent="1" nextAc="seek">
+              <p:cTn id="2" dur="indefinite" nodeType="mainSeq">
+                <p:childTnLst>
+                  <p:par>
+                    <p:cTn id="3" fill="hold">
+                      <p:stCondLst>
+                        <p:cond delay="indefinite"/>
+                      </p:stCondLst>
+                      <p:childTnLst>
+                        <p:par>
+                          <p:cTn id="4" fill="hold">
+                            <p:stCondLst>
+                              <p:cond delay="0"/>
+                            </p:stCondLst>
+                            <p:childTnLst>
+                              <p:par>
+                                <p:cTn id="5" presetID="1" presetClass="entr" presetSubtype="0" fill="hold" grpId="0" nodeType="clickEffect">
+                                  <p:stCondLst>
+                                    <p:cond delay="0"/>
+                                  </p:stCondLst>
+                                  <p:childTnLst>
+                                    <p:set>
+                                      <p:cBhvr>
+                                        <p:cTn id="6" dur="1" fill="hold">
+                                          <p:stCondLst>
+                                            <p:cond delay="0"/>
+                                          </p:stCondLst>
+                                        </p:cTn>
+                                        <p:tgtEl>
+                                          <p:spTgt spid="3">
+                                            <p:txEl>
+                                              <p:pRg st="0" end="0"/>
+                                            </p:txEl>
+                                          </p:spTgt>
+                                        </p:tgtEl>
+                                        <p:attrNameLst>
+                                          <p:attrName>style.visibility</p:attrName>
+                                        </p:attrNameLst>
+                                      </p:cBhvr>
+                                      <p:to>
+                                        <p:strVal val="visible"/>
+                                      </p:to>
+                                    </p:set>
+                                  </p:childTnLst>
+                                </p:cTn>
+                              </p:par>
+                            </p:childTnLst>
+                          </p:cTn>
+                        </p:par>
+                      </p:childTnLst>
+                    </p:cTn>
+                  </p:par>
+                  <p:par>
+                    <p:cTn id="7" fill="hold">
+                      <p:stCondLst>
+                        <p:cond delay="indefinite"/>
+                      </p:stCondLst>
+                      <p:childTnLst>
+                        <p:par>
+                          <p:cTn id="8" fill="hold">
+                            <p:stCondLst>
+                              <p:cond delay="0"/>
+                            </p:stCondLst>
+                            <p:childTnLst>
+                              <p:par>
+                                <p:cTn id="9" presetID="1" presetClass="entr" presetSubtype="0" fill="hold" grpId="0" nodeType="clickEffect">
+                                  <p:stCondLst>
+                                    <p:cond delay="0"/>
+                                  </p:stCondLst>
+                                  <p:childTnLst>
+                                    <p:set>
+                                      <p:cBhvr>
+                                        <p:cTn id="10" dur="1" fill="hold">
+                                          <p:stCondLst>
+                                            <p:cond delay="0"/>
+                                          </p:stCondLst>
+                                        </p:cTn>
+                                        <p:tgtEl>
+                                          <p:spTgt spid="3">
+                                            <p:txEl>
+                                              <p:pRg st="1" end="1"/>
+                                            </p:txEl>
+                                          </p:spTgt>
+                                        </p:tgtEl>
+                                        <p:attrNameLst>
+                                          <p:attrName>style.visibility</p:attrName>
+                                        </p:attrNameLst>
+                                      </p:cBhvr>
+                                      <p:to>
+                                        <p:strVal val="visible"/>
+                                      </p:to>
+                                    </p:set>
+                                  </p:childTnLst>
+                                </p:cTn>
+                              </p:par>
+                            </p:childTnLst>
+                          </p:cTn>
+                        </p:par>
+                      </p:childTnLst>
+                    </p:cTn>
+                  </p:par>
+                  <p:par>
+                    <p:cTn id="11" fill="hold">
+                      <p:stCondLst>
+                        <p:cond delay="indefinite"/>
+                      </p:stCondLst>
+                      <p:childTnLst>
+                        <p:par>
+                          <p:cTn id="12" fill="hold">
+                            <p:stCondLst>
+                              <p:cond delay="0"/>
+                            </p:stCondLst>
+                            <p:childTnLst>
+                              <p:par>
+                                <p:cTn id="13" presetID="1" presetClass="entr" presetSubtype="0" fill="hold" grpId="0" nodeType="clickEffect">
+                                  <p:stCondLst>
+                                    <p:cond delay="0"/>
+                                  </p:stCondLst>
+                                  <p:childTnLst>
+                                    <p:set>
+                                      <p:cBhvr>
+                                        <p:cTn id="14" dur="1" fill="hold">
+                                          <p:stCondLst>
+                                            <p:cond delay="0"/>
+                                          </p:stCondLst>
+                                        </p:cTn>
+                                        <p:tgtEl>
+                                          <p:spTgt spid="3">
+                                            <p:txEl>
+                                              <p:pRg st="2" end="2"/>
+                                            </p:txEl>
+                                          </p:spTgt>
+                                        </p:tgtEl>
+                                        <p:attrNameLst>
+                                          <p:attrName>style.visibility</p:attrName>
+                                        </p:attrNameLst>
+                                      </p:cBhvr>
+                                      <p:to>
+                                        <p:strVal val="visible"/>
+                                      </p:to>
+                                    </p:set>
+                                  </p:childTnLst>
+                                </p:cTn>
+                              </p:par>
+                            </p:childTnLst>
+                          </p:cTn>
+                        </p:par>
+                      </p:childTnLst>
+                    </p:cTn>
+                  </p:par>
+                </p:childTnLst>
+              </p:cTn>
+              <p:prevCondLst>
+                <p:cond evt="onPrev" delay="0">
+                  <p:tgtEl>
+                    <p:sldTgt/>
+                  </p:tgtEl>
+                </p:cond>
+              </p:prevCondLst>
+              <p:nextCondLst>
+                <p:cond evt="onNext" delay="0">
+                  <p:tgtEl>
+                    <p:sldTgt/>
+                  </p:tgtEl>
+                </p:cond>
+              </p:nextCondLst>
+            </p:seq>
+          </p:childTnLst>
+        </p:cTn>
+      </p:par>
+    </p:tnLst>
+    <p:bldLst>
+      <p:bldP spid="3" grpId="0" uiExpand="1" build="p"/>
+    </p:bldLst>
+  </p:timing>
+</p:sld>
+</file>
+
+<file path=ppt/slides/slide24.xml><?xml version="1.0" encoding="utf-8"?>
+<p:sld xmlns:a="http://schemas.openxmlformats.org/drawingml/2006/main" xmlns:r="http://schemas.openxmlformats.org/officeDocument/2006/relationships" xmlns:p="http://schemas.openxmlformats.org/presentationml/2006/main">
+  <p:cSld>
+    <p:spTree>
+      <p:nvGrpSpPr>
+        <p:cNvPr id="1" name=""/>
+        <p:cNvGrpSpPr/>
+        <p:nvPr/>
+      </p:nvGrpSpPr>
+      <p:grpSpPr>
+        <a:xfrm>
+          <a:off x="0" y="0"/>
+          <a:ext cx="0" cy="0"/>
+          <a:chOff x="0" y="0"/>
+          <a:chExt cx="0" cy="0"/>
+        </a:xfrm>
+      </p:grpSpPr>
+      <p:sp>
+        <p:nvSpPr>
+          <p:cNvPr id="2" name="Title 1"/>
+          <p:cNvSpPr>
+            <a:spLocks noGrp="1"/>
+          </p:cNvSpPr>
+          <p:nvPr>
+            <p:ph hasCustomPrompt="1" type="title"/>
+          </p:nvPr>
+        </p:nvSpPr>
+        <p:spPr>
+          <a:xfrm>
+            <a:off x="353292" y="238755"/>
+            <a:ext cx="8617526" cy="498666"/>
+          </a:xfrm>
+        </p:spPr>
+        <p:txBody>
+          <a:bodyPr/>
+          <a:lstStyle/>
+          <a:p>
+            <a:pPr lvl="0" indent="0" marL="0">
+              <a:buNone/>
+            </a:pPr>
+            <a:r>
+              <a:rPr/>
+              <a:t>Conte uma história</a:t>
+            </a:r>
+          </a:p>
+        </p:txBody>
+      </p:sp>
+      <p:sp>
+        <p:nvSpPr>
+          <p:cNvPr id="3" name="Content Placeholder 2"/>
+          <p:cNvSpPr>
+            <a:spLocks noGrp="1"/>
+          </p:cNvSpPr>
+          <p:nvPr>
+            <p:ph idx="1"/>
+          </p:nvPr>
+        </p:nvSpPr>
+        <p:spPr/>
+        <p:txBody>
+          <a:bodyPr/>
+          <a:lstStyle/>
+          <a:p>
+            <a:pPr lvl="0"/>
+            <a:r>
+              <a:rPr/>
+              <a:t>Diferentes formas de apresentação</a:t>
+            </a:r>
+          </a:p>
+          <a:p>
+            <a:pPr lvl="0"/>
+            <a:r>
+              <a:rPr/>
+              <a:t>Usar estruturas para narrativa</a:t>
+            </a:r>
+          </a:p>
+          <a:p>
+            <a:pPr lvl="0"/>
+            <a:r>
+              <a:rPr/>
+              <a:t>Pensar no tipo de apresentação a ser feita</a:t>
+            </a:r>
+          </a:p>
+        </p:txBody>
+      </p:sp>
+    </p:spTree>
+  </p:cSld>
+  <p:timing>
+    <p:tnLst>
+      <p:par>
+        <p:cTn id="1" dur="indefinite" restart="never" nodeType="tmRoot">
+          <p:childTnLst>
+            <p:seq concurrent="1" nextAc="seek">
+              <p:cTn id="2" dur="indefinite" nodeType="mainSeq">
+                <p:childTnLst>
+                  <p:par>
+                    <p:cTn id="3" fill="hold">
+                      <p:stCondLst>
+                        <p:cond delay="indefinite"/>
+                      </p:stCondLst>
+                      <p:childTnLst>
+                        <p:par>
+                          <p:cTn id="4" fill="hold">
+                            <p:stCondLst>
+                              <p:cond delay="0"/>
+                            </p:stCondLst>
+                            <p:childTnLst>
+                              <p:par>
+                                <p:cTn id="5" presetID="1" presetClass="entr" presetSubtype="0" fill="hold" grpId="0" nodeType="clickEffect">
+                                  <p:stCondLst>
+                                    <p:cond delay="0"/>
+                                  </p:stCondLst>
+                                  <p:childTnLst>
+                                    <p:set>
+                                      <p:cBhvr>
+                                        <p:cTn id="6" dur="1" fill="hold">
+                                          <p:stCondLst>
+                                            <p:cond delay="0"/>
+                                          </p:stCondLst>
+                                        </p:cTn>
+                                        <p:tgtEl>
+                                          <p:spTgt spid="3">
+                                            <p:txEl>
+                                              <p:pRg st="0" end="0"/>
+                                            </p:txEl>
+                                          </p:spTgt>
+                                        </p:tgtEl>
+                                        <p:attrNameLst>
+                                          <p:attrName>style.visibility</p:attrName>
+                                        </p:attrNameLst>
+                                      </p:cBhvr>
+                                      <p:to>
+                                        <p:strVal val="visible"/>
+                                      </p:to>
+                                    </p:set>
+                                  </p:childTnLst>
+                                </p:cTn>
+                              </p:par>
+                            </p:childTnLst>
+                          </p:cTn>
+                        </p:par>
+                      </p:childTnLst>
+                    </p:cTn>
+                  </p:par>
+                  <p:par>
+                    <p:cTn id="7" fill="hold">
+                      <p:stCondLst>
+                        <p:cond delay="indefinite"/>
+                      </p:stCondLst>
+                      <p:childTnLst>
+                        <p:par>
+                          <p:cTn id="8" fill="hold">
+                            <p:stCondLst>
+                              <p:cond delay="0"/>
+                            </p:stCondLst>
+                            <p:childTnLst>
+                              <p:par>
+                                <p:cTn id="9" presetID="1" presetClass="entr" presetSubtype="0" fill="hold" grpId="0" nodeType="clickEffect">
+                                  <p:stCondLst>
+                                    <p:cond delay="0"/>
+                                  </p:stCondLst>
+                                  <p:childTnLst>
+                                    <p:set>
+                                      <p:cBhvr>
+                                        <p:cTn id="10" dur="1" fill="hold">
+                                          <p:stCondLst>
+                                            <p:cond delay="0"/>
+                                          </p:stCondLst>
+                                        </p:cTn>
+                                        <p:tgtEl>
+                                          <p:spTgt spid="3">
+                                            <p:txEl>
+                                              <p:pRg st="1" end="1"/>
+                                            </p:txEl>
+                                          </p:spTgt>
+                                        </p:tgtEl>
+                                        <p:attrNameLst>
+                                          <p:attrName>style.visibility</p:attrName>
+                                        </p:attrNameLst>
+                                      </p:cBhvr>
+                                      <p:to>
+                                        <p:strVal val="visible"/>
+                                      </p:to>
+                                    </p:set>
+                                  </p:childTnLst>
+                                </p:cTn>
+                              </p:par>
+                            </p:childTnLst>
+                          </p:cTn>
+                        </p:par>
+                      </p:childTnLst>
+                    </p:cTn>
+                  </p:par>
+                  <p:par>
+                    <p:cTn id="11" fill="hold">
+                      <p:stCondLst>
+                        <p:cond delay="indefinite"/>
+                      </p:stCondLst>
+                      <p:childTnLst>
+                        <p:par>
+                          <p:cTn id="12" fill="hold">
+                            <p:stCondLst>
+                              <p:cond delay="0"/>
+                            </p:stCondLst>
+                            <p:childTnLst>
+                              <p:par>
+                                <p:cTn id="13" presetID="1" presetClass="entr" presetSubtype="0" fill="hold" grpId="0" nodeType="clickEffect">
+                                  <p:stCondLst>
+                                    <p:cond delay="0"/>
+                                  </p:stCondLst>
+                                  <p:childTnLst>
+                                    <p:set>
+                                      <p:cBhvr>
+                                        <p:cTn id="14" dur="1" fill="hold">
+                                          <p:stCondLst>
+                                            <p:cond delay="0"/>
+                                          </p:stCondLst>
+                                        </p:cTn>
+                                        <p:tgtEl>
+                                          <p:spTgt spid="3">
+                                            <p:txEl>
+                                              <p:pRg st="2" end="2"/>
+                                            </p:txEl>
+                                          </p:spTgt>
+                                        </p:tgtEl>
+                                        <p:attrNameLst>
+                                          <p:attrName>style.visibility</p:attrName>
+                                        </p:attrNameLst>
+                                      </p:cBhvr>
+                                      <p:to>
+                                        <p:strVal val="visible"/>
+                                      </p:to>
+                                    </p:set>
+                                  </p:childTnLst>
+                                </p:cTn>
+                              </p:par>
+                            </p:childTnLst>
+                          </p:cTn>
+                        </p:par>
+                      </p:childTnLst>
+                    </p:cTn>
+                  </p:par>
+                </p:childTnLst>
+              </p:cTn>
+              <p:prevCondLst>
+                <p:cond evt="onPrev" delay="0">
+                  <p:tgtEl>
+                    <p:sldTgt/>
+                  </p:tgtEl>
+                </p:cond>
+              </p:prevCondLst>
+              <p:nextCondLst>
+                <p:cond evt="onNext" delay="0">
+                  <p:tgtEl>
+                    <p:sldTgt/>
+                  </p:tgtEl>
+                </p:cond>
+              </p:nextCondLst>
+            </p:seq>
+          </p:childTnLst>
+        </p:cTn>
+      </p:par>
+    </p:tnLst>
+    <p:bldLst>
+      <p:bldP spid="3" grpId="0" uiExpand="1" build="p"/>
+    </p:bldLst>
+  </p:timing>
+</p:sld>
+</file>
+
+<file path=ppt/slides/slide25.xml><?xml version="1.0" encoding="utf-8"?>
+<p:sld xmlns:a="http://schemas.openxmlformats.org/drawingml/2006/main" xmlns:r="http://schemas.openxmlformats.org/officeDocument/2006/relationships" xmlns:p="http://schemas.openxmlformats.org/presentationml/2006/main">
+  <p:cSld>
+    <p:spTree>
+      <p:nvGrpSpPr>
+        <p:cNvPr id="1" name=""/>
+        <p:cNvGrpSpPr/>
+        <p:nvPr/>
+      </p:nvGrpSpPr>
+      <p:grpSpPr>
+        <a:xfrm>
+          <a:off x="0" y="0"/>
+          <a:ext cx="0" cy="0"/>
+          <a:chOff x="0" y="0"/>
+          <a:chExt cx="0" cy="0"/>
+        </a:xfrm>
+      </p:grpSpPr>
+      <p:sp>
+        <p:nvSpPr>
+          <p:cNvPr id="2" name="Title 1"/>
+          <p:cNvSpPr>
+            <a:spLocks noGrp="1"/>
+          </p:cNvSpPr>
+          <p:nvPr>
+            <p:ph hasCustomPrompt="1" type="title"/>
+          </p:nvPr>
+        </p:nvSpPr>
+        <p:spPr>
+          <a:xfrm>
+            <a:off x="353292" y="238755"/>
+            <a:ext cx="8617526" cy="498666"/>
+          </a:xfrm>
+        </p:spPr>
+        <p:txBody>
+          <a:bodyPr/>
+          <a:lstStyle/>
+          <a:p>
+            <a:pPr lvl="0" indent="0" marL="0">
+              <a:buNone/>
+            </a:pPr>
+            <a:r>
+              <a:rPr/>
+              <a:t>Fontes/Bibliografia</a:t>
+            </a:r>
+          </a:p>
+        </p:txBody>
+      </p:sp>
+      <p:sp>
+        <p:nvSpPr>
+          <p:cNvPr id="3" name="Content Placeholder 2"/>
+          <p:cNvSpPr>
+            <a:spLocks noGrp="1"/>
+          </p:cNvSpPr>
+          <p:nvPr>
+            <p:ph idx="1"/>
+          </p:nvPr>
+        </p:nvSpPr>
+        <p:spPr/>
+        <p:txBody>
+          <a:bodyPr/>
+          <a:lstStyle/>
+          <a:p>
+            <a:pPr lvl="0"/>
+            <a:r>
+              <a:rPr/>
+              <a:t>https://www.storytellingwithdata.com/chart-guide</a:t>
+            </a:r>
+          </a:p>
+          <a:p>
+            <a:pPr lvl="0"/>
+            <a:r>
+              <a:rPr/>
+              <a:t>Knaflic, C.N. Storytelling com dados:um guia sobre visualização de dados para profissionais de negócios. 2ª edição. Rio de Janeiro: Alta Books, 2019.</a:t>
+            </a:r>
+          </a:p>
+        </p:txBody>
+      </p:sp>
+    </p:spTree>
+  </p:cSld>
+  <p:timing>
+    <p:tnLst>
+      <p:par>
+        <p:cTn id="1" dur="indefinite" restart="never" nodeType="tmRoot">
+          <p:childTnLst>
+            <p:seq concurrent="1" nextAc="seek">
+              <p:cTn id="2" dur="indefinite" nodeType="mainSeq">
+                <p:childTnLst>
+                  <p:par>
+                    <p:cTn id="3" fill="hold">
+                      <p:stCondLst>
+                        <p:cond delay="indefinite"/>
+                      </p:stCondLst>
+                      <p:childTnLst>
+                        <p:par>
+                          <p:cTn id="4" fill="hold">
+                            <p:stCondLst>
+                              <p:cond delay="0"/>
+                            </p:stCondLst>
+                            <p:childTnLst>
+                              <p:par>
+                                <p:cTn id="5" presetID="1" presetClass="entr" presetSubtype="0" fill="hold" grpId="0" nodeType="clickEffect">
+                                  <p:stCondLst>
+                                    <p:cond delay="0"/>
+                                  </p:stCondLst>
+                                  <p:childTnLst>
+                                    <p:set>
+                                      <p:cBhvr>
+                                        <p:cTn id="6" dur="1" fill="hold">
+                                          <p:stCondLst>
+                                            <p:cond delay="0"/>
+                                          </p:stCondLst>
+                                        </p:cTn>
+                                        <p:tgtEl>
+                                          <p:spTgt spid="3">
+                                            <p:txEl>
+                                              <p:pRg st="0" end="0"/>
+                                            </p:txEl>
+                                          </p:spTgt>
+                                        </p:tgtEl>
+                                        <p:attrNameLst>
+                                          <p:attrName>style.visibility</p:attrName>
+                                        </p:attrNameLst>
+                                      </p:cBhvr>
+                                      <p:to>
+                                        <p:strVal val="visible"/>
+                                      </p:to>
+                                    </p:set>
+                                  </p:childTnLst>
+                                </p:cTn>
+                              </p:par>
+                            </p:childTnLst>
+                          </p:cTn>
+                        </p:par>
+                      </p:childTnLst>
+                    </p:cTn>
+                  </p:par>
+                  <p:par>
+                    <p:cTn id="7" fill="hold">
+                      <p:stCondLst>
+                        <p:cond delay="indefinite"/>
+                      </p:stCondLst>
+                      <p:childTnLst>
+                        <p:par>
+                          <p:cTn id="8" fill="hold">
+                            <p:stCondLst>
+                              <p:cond delay="0"/>
+                            </p:stCondLst>
+                            <p:childTnLst>
+                              <p:par>
+                                <p:cTn id="9" presetID="1" presetClass="entr" presetSubtype="0" fill="hold" grpId="0" nodeType="clickEffect">
+                                  <p:stCondLst>
+                                    <p:cond delay="0"/>
+                                  </p:stCondLst>
+                                  <p:childTnLst>
+                                    <p:set>
+                                      <p:cBhvr>
+                                        <p:cTn id="10" dur="1" fill="hold">
+                                          <p:stCondLst>
+                                            <p:cond delay="0"/>
+                                          </p:stCondLst>
+                                        </p:cTn>
+                                        <p:tgtEl>
+                                          <p:spTgt spid="3">
+                                            <p:txEl>
+                                              <p:pRg st="1" end="1"/>
+                                            </p:txEl>
+                                          </p:spTgt>
+                                        </p:tgtEl>
+                                        <p:attrNameLst>
+                                          <p:attrName>style.visibility</p:attrName>
+                                        </p:attrNameLst>
+                                      </p:cBhvr>
+                                      <p:to>
+                                        <p:strVal val="visible"/>
+                                      </p:to>
+                                    </p:set>
+                                  </p:childTnLst>
+                                </p:cTn>
+                              </p:par>
+                            </p:childTnLst>
+                          </p:cTn>
+                        </p:par>
+                      </p:childTnLst>
+                    </p:cTn>
+                  </p:par>
+                </p:childTnLst>
+              </p:cTn>
+              <p:prevCondLst>
+                <p:cond evt="onPrev" delay="0">
+                  <p:tgtEl>
+                    <p:sldTgt/>
+                  </p:tgtEl>
+                </p:cond>
+              </p:prevCondLst>
+              <p:nextCondLst>
+                <p:cond evt="onNext" delay="0">
+                  <p:tgtEl>
+                    <p:sldTgt/>
+                  </p:tgtEl>
+                </p:cond>
+              </p:nextCondLst>
+            </p:seq>
+          </p:childTnLst>
+        </p:cTn>
+      </p:par>
+    </p:tnLst>
+    <p:bldLst>
+      <p:bldP spid="3" grpId="0" uiExpand="1" build="p"/>
+    </p:bldLst>
+  </p:timing>
+</p:sld>
+</file>
+
+<file path=ppt/slides/slide26.xml><?xml version="1.0" encoding="utf-8"?>
+<p:sld xmlns:a="http://schemas.openxmlformats.org/drawingml/2006/main" xmlns:r="http://schemas.openxmlformats.org/officeDocument/2006/relationships" xmlns:p="http://schemas.openxmlformats.org/presentationml/2006/main">
+  <p:cSld>
+    <p:spTree>
+      <p:nvGrpSpPr>
+        <p:cNvPr id="1" name=""/>
+        <p:cNvGrpSpPr/>
+        <p:nvPr/>
+      </p:nvGrpSpPr>
+      <p:grpSpPr>
+        <a:xfrm>
+          <a:off x="0" y="0"/>
+          <a:ext cx="0" cy="0"/>
+          <a:chOff x="0" y="0"/>
+          <a:chExt cx="0" cy="0"/>
+        </a:xfrm>
+      </p:grpSpPr>
+      <p:sp>
+        <p:nvSpPr>
+          <p:cNvPr id="2" name="Title 1"/>
+          <p:cNvSpPr>
+            <a:spLocks noGrp="1"/>
+          </p:cNvSpPr>
+          <p:nvPr>
+            <p:ph hasCustomPrompt="1" type="title"/>
+          </p:nvPr>
+        </p:nvSpPr>
+        <p:spPr>
+          <a:xfrm>
+            <a:off x="353292" y="238755"/>
+            <a:ext cx="8617526" cy="498666"/>
+          </a:xfrm>
+        </p:spPr>
+        <p:txBody>
+          <a:bodyPr/>
+          <a:lstStyle/>
+          <a:p>
+            <a:pPr lvl="0" indent="0" marL="0">
+              <a:buNone/>
+            </a:pPr>
+            <a:r>
+              <a:rPr/>
+              <a:t>Obrigado!</a:t>
+            </a:r>
+          </a:p>
+        </p:txBody>
+      </p:sp>
     </p:spTree>
   </p:cSld>
 </p:sld>

</xml_diff>